<commit_message>
bab 3 : percabangan textbook + slide teori
</commit_message>
<xml_diff>
--- a/Presentasi/Pertemuan 3 Percabangan.pptx
+++ b/Presentasi/Pertemuan 3 Percabangan.pptx
@@ -5,7 +5,7 @@
     <p:sldMasterId id="2147483756" r:id="rId1"/>
   </p:sldMasterIdLst>
   <p:notesMasterIdLst>
-    <p:notesMasterId r:id="rId16"/>
+    <p:notesMasterId r:id="rId18"/>
   </p:notesMasterIdLst>
   <p:sldIdLst>
     <p:sldId id="266" r:id="rId2"/>
@@ -21,7 +21,9 @@
     <p:sldId id="264" r:id="rId12"/>
     <p:sldId id="265" r:id="rId13"/>
     <p:sldId id="270" r:id="rId14"/>
-    <p:sldId id="271" r:id="rId15"/>
+    <p:sldId id="272" r:id="rId15"/>
+    <p:sldId id="273" r:id="rId16"/>
+    <p:sldId id="271" r:id="rId17"/>
   </p:sldIdLst>
   <p:sldSz cx="9144000" cy="6858000" type="screen4x3"/>
   <p:notesSz cx="6858000" cy="9144000"/>
@@ -205,7 +207,8 @@
           <a:p>
             <a:fld id="{22D9CEE0-0529-4C0F-9C08-225539C45C44}" type="datetimeFigureOut">
               <a:rPr lang="id-ID" smtClean="0"/>
-              <a:t>28/09/2014</a:t>
+              <a:pPr/>
+              <a:t>29/09/2014</a:t>
             </a:fld>
             <a:endParaRPr lang="id-ID"/>
           </a:p>
@@ -366,6 +369,7 @@
           <a:p>
             <a:fld id="{AFEB3648-CA5A-48C3-A455-E66C0A755BE5}" type="slidenum">
               <a:rPr lang="id-ID" smtClean="0"/>
+              <a:pPr/>
               <a:t>‹#›</a:t>
             </a:fld>
             <a:endParaRPr lang="id-ID"/>
@@ -734,7 +738,7 @@
             <a:fld id="{1A58205A-0657-4474-BA32-A26B7D409708}" type="datetimeFigureOut">
               <a:rPr lang="en-US" smtClean="0"/>
               <a:pPr/>
-              <a:t>9/28/2014</a:t>
+              <a:t>9/29/2014</a:t>
             </a:fld>
             <a:endParaRPr lang="en-US"/>
           </a:p>
@@ -901,7 +905,7 @@
             <a:fld id="{1A58205A-0657-4474-BA32-A26B7D409708}" type="datetimeFigureOut">
               <a:rPr lang="en-US" smtClean="0"/>
               <a:pPr/>
-              <a:t>9/28/2014</a:t>
+              <a:t>9/29/2014</a:t>
             </a:fld>
             <a:endParaRPr lang="en-US"/>
           </a:p>
@@ -1078,7 +1082,7 @@
             <a:fld id="{1A58205A-0657-4474-BA32-A26B7D409708}" type="datetimeFigureOut">
               <a:rPr lang="en-US" smtClean="0"/>
               <a:pPr/>
-              <a:t>9/28/2014</a:t>
+              <a:t>9/29/2014</a:t>
             </a:fld>
             <a:endParaRPr lang="en-US"/>
           </a:p>
@@ -1245,7 +1249,7 @@
             <a:fld id="{1A58205A-0657-4474-BA32-A26B7D409708}" type="datetimeFigureOut">
               <a:rPr lang="en-US" smtClean="0"/>
               <a:pPr/>
-              <a:t>9/28/2014</a:t>
+              <a:t>9/29/2014</a:t>
             </a:fld>
             <a:endParaRPr lang="en-US"/>
           </a:p>
@@ -1488,7 +1492,7 @@
             <a:fld id="{1A58205A-0657-4474-BA32-A26B7D409708}" type="datetimeFigureOut">
               <a:rPr lang="en-US" smtClean="0"/>
               <a:pPr/>
-              <a:t>9/28/2014</a:t>
+              <a:t>9/29/2014</a:t>
             </a:fld>
             <a:endParaRPr lang="en-US"/>
           </a:p>
@@ -1773,7 +1777,7 @@
             <a:fld id="{1A58205A-0657-4474-BA32-A26B7D409708}" type="datetimeFigureOut">
               <a:rPr lang="en-US" smtClean="0"/>
               <a:pPr/>
-              <a:t>9/28/2014</a:t>
+              <a:t>9/29/2014</a:t>
             </a:fld>
             <a:endParaRPr lang="en-US"/>
           </a:p>
@@ -2192,7 +2196,7 @@
             <a:fld id="{1A58205A-0657-4474-BA32-A26B7D409708}" type="datetimeFigureOut">
               <a:rPr lang="en-US" smtClean="0"/>
               <a:pPr/>
-              <a:t>9/28/2014</a:t>
+              <a:t>9/29/2014</a:t>
             </a:fld>
             <a:endParaRPr lang="en-US"/>
           </a:p>
@@ -2307,7 +2311,7 @@
             <a:fld id="{1A58205A-0657-4474-BA32-A26B7D409708}" type="datetimeFigureOut">
               <a:rPr lang="en-US" smtClean="0"/>
               <a:pPr/>
-              <a:t>9/28/2014</a:t>
+              <a:t>9/29/2014</a:t>
             </a:fld>
             <a:endParaRPr lang="en-US"/>
           </a:p>
@@ -2399,7 +2403,7 @@
             <a:fld id="{1A58205A-0657-4474-BA32-A26B7D409708}" type="datetimeFigureOut">
               <a:rPr lang="en-US" smtClean="0"/>
               <a:pPr/>
-              <a:t>9/28/2014</a:t>
+              <a:t>9/29/2014</a:t>
             </a:fld>
             <a:endParaRPr lang="en-US"/>
           </a:p>
@@ -2673,7 +2677,7 @@
             <a:fld id="{1A58205A-0657-4474-BA32-A26B7D409708}" type="datetimeFigureOut">
               <a:rPr lang="en-US" smtClean="0"/>
               <a:pPr/>
-              <a:t>9/28/2014</a:t>
+              <a:t>9/29/2014</a:t>
             </a:fld>
             <a:endParaRPr lang="en-US"/>
           </a:p>
@@ -2923,7 +2927,7 @@
             <a:fld id="{1A58205A-0657-4474-BA32-A26B7D409708}" type="datetimeFigureOut">
               <a:rPr lang="en-US" smtClean="0"/>
               <a:pPr/>
-              <a:t>9/28/2014</a:t>
+              <a:t>9/29/2014</a:t>
             </a:fld>
             <a:endParaRPr lang="en-US"/>
           </a:p>
@@ -3196,7 +3200,7 @@
             <a:fld id="{1A58205A-0657-4474-BA32-A26B7D409708}" type="datetimeFigureOut">
               <a:rPr lang="en-US" smtClean="0"/>
               <a:pPr/>
-              <a:t>9/28/2014</a:t>
+              <a:t>9/29/2014</a:t>
             </a:fld>
             <a:endParaRPr lang="en-US"/>
           </a:p>
@@ -3749,7 +3753,7 @@
           <a:blip r:embed="rId3">
             <a:extLst>
               <a:ext uri="{28A0092B-C50C-407E-A947-70E740481C1C}">
-                <a14:useLocalDpi xmlns:a14="http://schemas.microsoft.com/office/drawing/2010/main" xmlns="" val="0"/>
+                <a14:useLocalDpi xmlns="" xmlns:a14="http://schemas.microsoft.com/office/drawing/2010/main" val="0"/>
               </a:ext>
             </a:extLst>
           </a:blip>
@@ -4562,7 +4566,7 @@
     </p:spTree>
     <p:extLst>
       <p:ext uri="{BB962C8B-B14F-4D97-AF65-F5344CB8AC3E}">
-        <p14:creationId xmlns:p14="http://schemas.microsoft.com/office/powerpoint/2010/main" xmlns="" val="2612378990"/>
+        <p14:creationId xmlns="" xmlns:p14="http://schemas.microsoft.com/office/powerpoint/2010/main" val="2612378990"/>
       </p:ext>
     </p:extLst>
   </p:cSld>
@@ -4886,7 +4890,7 @@
     </p:spTree>
     <p:extLst>
       <p:ext uri="{BB962C8B-B14F-4D97-AF65-F5344CB8AC3E}">
-        <p14:creationId xmlns:p14="http://schemas.microsoft.com/office/powerpoint/2010/main" xmlns="" val="3420823012"/>
+        <p14:creationId xmlns="" xmlns:p14="http://schemas.microsoft.com/office/powerpoint/2010/main" val="3420823012"/>
       </p:ext>
     </p:extLst>
   </p:cSld>
@@ -4998,6 +5002,202 @@
 </file>
 
 <file path=ppt/slides/slide14.xml><?xml version="1.0" encoding="utf-8"?>
+<p:sld xmlns:a="http://schemas.openxmlformats.org/drawingml/2006/main" xmlns:r="http://schemas.openxmlformats.org/officeDocument/2006/relationships" xmlns:p="http://schemas.openxmlformats.org/presentationml/2006/main">
+  <p:cSld>
+    <p:spTree>
+      <p:nvGrpSpPr>
+        <p:cNvPr id="1" name=""/>
+        <p:cNvGrpSpPr/>
+        <p:nvPr/>
+      </p:nvGrpSpPr>
+      <p:grpSpPr>
+        <a:xfrm>
+          <a:off x="0" y="0"/>
+          <a:ext cx="0" cy="0"/>
+          <a:chOff x="0" y="0"/>
+          <a:chExt cx="0" cy="0"/>
+        </a:xfrm>
+      </p:grpSpPr>
+      <p:sp>
+        <p:nvSpPr>
+          <p:cNvPr id="2" name="Title 1"/>
+          <p:cNvSpPr>
+            <a:spLocks noGrp="1"/>
+          </p:cNvSpPr>
+          <p:nvPr>
+            <p:ph type="title"/>
+          </p:nvPr>
+        </p:nvSpPr>
+        <p:spPr/>
+        <p:txBody>
+          <a:bodyPr/>
+          <a:lstStyle/>
+          <a:p>
+            <a:endParaRPr lang="id-ID"/>
+          </a:p>
+        </p:txBody>
+      </p:sp>
+      <p:sp>
+        <p:nvSpPr>
+          <p:cNvPr id="3" name="Content Placeholder 2"/>
+          <p:cNvSpPr>
+            <a:spLocks noGrp="1"/>
+          </p:cNvSpPr>
+          <p:nvPr>
+            <p:ph idx="1"/>
+          </p:nvPr>
+        </p:nvSpPr>
+        <p:spPr/>
+        <p:txBody>
+          <a:bodyPr/>
+          <a:lstStyle/>
+          <a:p>
+            <a:endParaRPr lang="id-ID"/>
+          </a:p>
+        </p:txBody>
+      </p:sp>
+      <p:pic>
+        <p:nvPicPr>
+          <p:cNvPr id="4098" name="Picture 2"/>
+          <p:cNvPicPr>
+            <a:picLocks noChangeAspect="1" noChangeArrowheads="1"/>
+          </p:cNvPicPr>
+          <p:nvPr/>
+        </p:nvPicPr>
+        <p:blipFill>
+          <a:blip r:embed="rId2"/>
+          <a:srcRect b="40299"/>
+          <a:stretch>
+            <a:fillRect/>
+          </a:stretch>
+        </p:blipFill>
+        <p:spPr bwMode="auto">
+          <a:xfrm>
+            <a:off x="381000" y="228600"/>
+            <a:ext cx="8534400" cy="6096000"/>
+          </a:xfrm>
+          <a:prstGeom prst="rect">
+            <a:avLst/>
+          </a:prstGeom>
+          <a:ln>
+            <a:noFill/>
+          </a:ln>
+          <a:effectLst>
+            <a:outerShdw blurRad="292100" dist="139700" dir="2700000" algn="tl" rotWithShape="0">
+              <a:srgbClr val="333333">
+                <a:alpha val="65000"/>
+              </a:srgbClr>
+            </a:outerShdw>
+          </a:effectLst>
+        </p:spPr>
+      </p:pic>
+    </p:spTree>
+  </p:cSld>
+  <p:clrMapOvr>
+    <a:masterClrMapping/>
+  </p:clrMapOvr>
+</p:sld>
+</file>
+
+<file path=ppt/slides/slide15.xml><?xml version="1.0" encoding="utf-8"?>
+<p:sld xmlns:a="http://schemas.openxmlformats.org/drawingml/2006/main" xmlns:r="http://schemas.openxmlformats.org/officeDocument/2006/relationships" xmlns:p="http://schemas.openxmlformats.org/presentationml/2006/main">
+  <p:cSld>
+    <p:spTree>
+      <p:nvGrpSpPr>
+        <p:cNvPr id="1" name=""/>
+        <p:cNvGrpSpPr/>
+        <p:nvPr/>
+      </p:nvGrpSpPr>
+      <p:grpSpPr>
+        <a:xfrm>
+          <a:off x="0" y="0"/>
+          <a:ext cx="0" cy="0"/>
+          <a:chOff x="0" y="0"/>
+          <a:chExt cx="0" cy="0"/>
+        </a:xfrm>
+      </p:grpSpPr>
+      <p:sp>
+        <p:nvSpPr>
+          <p:cNvPr id="2" name="Title 1"/>
+          <p:cNvSpPr>
+            <a:spLocks noGrp="1"/>
+          </p:cNvSpPr>
+          <p:nvPr>
+            <p:ph type="title"/>
+          </p:nvPr>
+        </p:nvSpPr>
+        <p:spPr/>
+        <p:txBody>
+          <a:bodyPr/>
+          <a:lstStyle/>
+          <a:p>
+            <a:endParaRPr lang="id-ID"/>
+          </a:p>
+        </p:txBody>
+      </p:sp>
+      <p:sp>
+        <p:nvSpPr>
+          <p:cNvPr id="3" name="Content Placeholder 2"/>
+          <p:cNvSpPr>
+            <a:spLocks noGrp="1"/>
+          </p:cNvSpPr>
+          <p:nvPr>
+            <p:ph idx="1"/>
+          </p:nvPr>
+        </p:nvSpPr>
+        <p:spPr/>
+        <p:txBody>
+          <a:bodyPr/>
+          <a:lstStyle/>
+          <a:p>
+            <a:endParaRPr lang="id-ID"/>
+          </a:p>
+        </p:txBody>
+      </p:sp>
+      <p:pic>
+        <p:nvPicPr>
+          <p:cNvPr id="5122" name="Picture 2"/>
+          <p:cNvPicPr>
+            <a:picLocks noChangeAspect="1" noChangeArrowheads="1"/>
+          </p:cNvPicPr>
+          <p:nvPr/>
+        </p:nvPicPr>
+        <p:blipFill>
+          <a:blip r:embed="rId2"/>
+          <a:srcRect/>
+          <a:stretch>
+            <a:fillRect/>
+          </a:stretch>
+        </p:blipFill>
+        <p:spPr bwMode="auto">
+          <a:xfrm>
+            <a:off x="371475" y="2119313"/>
+            <a:ext cx="8401050" cy="2619375"/>
+          </a:xfrm>
+          <a:prstGeom prst="rect">
+            <a:avLst/>
+          </a:prstGeom>
+          <a:ln>
+            <a:noFill/>
+          </a:ln>
+          <a:effectLst>
+            <a:outerShdw blurRad="292100" dist="139700" dir="2700000" algn="tl" rotWithShape="0">
+              <a:srgbClr val="333333">
+                <a:alpha val="65000"/>
+              </a:srgbClr>
+            </a:outerShdw>
+          </a:effectLst>
+        </p:spPr>
+      </p:pic>
+    </p:spTree>
+  </p:cSld>
+  <p:clrMapOvr>
+    <a:masterClrMapping/>
+  </p:clrMapOvr>
+</p:sld>
+</file>
+
+<file path=ppt/slides/slide16.xml><?xml version="1.0" encoding="utf-8"?>
 <p:sld xmlns:a="http://schemas.openxmlformats.org/drawingml/2006/main" xmlns:r="http://schemas.openxmlformats.org/officeDocument/2006/relationships" xmlns:p="http://schemas.openxmlformats.org/presentationml/2006/main">
   <p:cSld>
     <p:spTree>
@@ -6988,7 +7188,7 @@
     </p:spTree>
     <p:extLst>
       <p:ext uri="{BB962C8B-B14F-4D97-AF65-F5344CB8AC3E}">
-        <p14:creationId xmlns:p14="http://schemas.microsoft.com/office/powerpoint/2010/main" xmlns="" val="3405230258"/>
+        <p14:creationId xmlns="" xmlns:p14="http://schemas.microsoft.com/office/powerpoint/2010/main" val="3405230258"/>
       </p:ext>
     </p:extLst>
   </p:cSld>
@@ -7435,7 +7635,7 @@
     </p:spTree>
     <p:extLst>
       <p:ext uri="{BB962C8B-B14F-4D97-AF65-F5344CB8AC3E}">
-        <p14:creationId xmlns:p14="http://schemas.microsoft.com/office/powerpoint/2010/main" xmlns="" val="1447500300"/>
+        <p14:creationId xmlns="" xmlns:p14="http://schemas.microsoft.com/office/powerpoint/2010/main" val="1447500300"/>
       </p:ext>
     </p:extLst>
   </p:cSld>
@@ -8069,7 +8269,7 @@
     </p:spTree>
     <p:extLst>
       <p:ext uri="{BB962C8B-B14F-4D97-AF65-F5344CB8AC3E}">
-        <p14:creationId xmlns:p14="http://schemas.microsoft.com/office/powerpoint/2010/main" xmlns="" val="1486806831"/>
+        <p14:creationId xmlns="" xmlns:p14="http://schemas.microsoft.com/office/powerpoint/2010/main" val="1486806831"/>
       </p:ext>
     </p:extLst>
   </p:cSld>
@@ -8245,7 +8445,21 @@
                 <a:latin typeface="Times New Roman" pitchFamily="18" charset="0"/>
                 <a:cs typeface="Times New Roman" pitchFamily="18" charset="0"/>
               </a:rPr>
-              <a:t>				Salah</a:t>
+              <a:t>			</a:t>
+            </a:r>
+            <a:r>
+              <a:rPr lang="en-US" smtClean="0">
+                <a:latin typeface="Times New Roman" pitchFamily="18" charset="0"/>
+                <a:cs typeface="Times New Roman" pitchFamily="18" charset="0"/>
+              </a:rPr>
+              <a:t>	</a:t>
+            </a:r>
+            <a:r>
+              <a:rPr lang="id-ID" smtClean="0">
+                <a:latin typeface="Times New Roman" pitchFamily="18" charset="0"/>
+                <a:cs typeface="Times New Roman" pitchFamily="18" charset="0"/>
+              </a:rPr>
+              <a:t>Benar</a:t>
             </a:r>
             <a:endParaRPr lang="en-US" dirty="0">
               <a:latin typeface="Times New Roman" pitchFamily="18" charset="0"/>
@@ -8421,7 +8635,7 @@
     </p:spTree>
     <p:extLst>
       <p:ext uri="{BB962C8B-B14F-4D97-AF65-F5344CB8AC3E}">
-        <p14:creationId xmlns:p14="http://schemas.microsoft.com/office/powerpoint/2010/main" xmlns="" val="296304656"/>
+        <p14:creationId xmlns="" xmlns:p14="http://schemas.microsoft.com/office/powerpoint/2010/main" val="296304656"/>
       </p:ext>
     </p:extLst>
   </p:cSld>
@@ -9296,7 +9510,7 @@
     </p:spTree>
     <p:extLst>
       <p:ext uri="{BB962C8B-B14F-4D97-AF65-F5344CB8AC3E}">
-        <p14:creationId xmlns:p14="http://schemas.microsoft.com/office/powerpoint/2010/main" xmlns="" val="1083835830"/>
+        <p14:creationId xmlns="" xmlns:p14="http://schemas.microsoft.com/office/powerpoint/2010/main" val="1083835830"/>
       </p:ext>
     </p:extLst>
   </p:cSld>
@@ -9434,7 +9648,7 @@
     </p:spTree>
     <p:extLst>
       <p:ext uri="{BB962C8B-B14F-4D97-AF65-F5344CB8AC3E}">
-        <p14:creationId xmlns:p14="http://schemas.microsoft.com/office/powerpoint/2010/main" xmlns="" val="1503401637"/>
+        <p14:creationId xmlns="" xmlns:p14="http://schemas.microsoft.com/office/powerpoint/2010/main" val="1503401637"/>
       </p:ext>
     </p:extLst>
   </p:cSld>

</xml_diff>